<commit_message>
adding tags and rules
</commit_message>
<xml_diff>
--- a/aws_sra_examples/solutions/genai/sra_guardduty_malware_protection_for_s3/documentation/sra-guardduty-malware-protection-for-s3.pptx
+++ b/aws_sra_examples/solutions/genai/sra_guardduty_malware_protection_for_s3/documentation/sra-guardduty-malware-protection-for-s3.pptx
@@ -107,6 +107,11 @@
       </a:defRPr>
     </a:lvl9pPr>
   </p:defaultTextStyle>
+  <p:extLst>
+    <p:ext uri="{EFAFB233-063F-42B5-8137-9DF3F51BA10A}">
+      <p15:sldGuideLst xmlns:p15="http://schemas.microsoft.com/office/powerpoint/2012/main"/>
+    </p:ext>
+  </p:extLst>
 </p:presentation>
 </file>
 
@@ -4192,8 +4197,8 @@
         </p:nvSpPr>
         <p:spPr>
           <a:xfrm>
-            <a:off x="9218720" y="2304289"/>
-            <a:ext cx="1582979" cy="430887"/>
+            <a:off x="9154518" y="2304289"/>
+            <a:ext cx="1647182" cy="600164"/>
           </a:xfrm>
           <a:prstGeom prst="rect">
             <a:avLst/>
@@ -4212,7 +4217,7 @@
                 <a:latin typeface="Arial" panose="020B0604020202020204" pitchFamily="34" charset="0"/>
                 <a:cs typeface="Arial" panose="020B0604020202020204" pitchFamily="34" charset="0"/>
               </a:rPr>
-              <a:t>Guard Duty S3 Malware Protection</a:t>
+              <a:t>Amazon GuardDuty Malware Protection for S3</a:t>
             </a:r>
           </a:p>
         </p:txBody>

</xml_diff>